<commit_message>
Updated presentation for Release 1`
Add notes
</commit_message>
<xml_diff>
--- a/doc/submission/RSRAFVP Final Project Presentation.pptx
+++ b/doc/submission/RSRAFVP Final Project Presentation.pptx
@@ -949,135 +949,20 @@
             </a:pPr>
             <a:r>
               <a:rPr lang="en-US" dirty="0"/>
-              <a:t>This assessments reviews a patient’s functionality across 8 main categories: </a:t>
+              <a:t>The R-SRAFVP assessment is used by medical professionals specializing in low vision rehabilitation</a:t>
             </a:r>
           </a:p>
           <a:p>
-            <a:pPr marL="171450" lvl="0" indent="-171450" algn="l" rtl="0">
-              <a:spcBef>
-                <a:spcPts val="0"/>
-              </a:spcBef>
-              <a:spcAft>
-                <a:spcPts val="0"/>
-              </a:spcAft>
-            </a:pPr>
-            <a:r>
-              <a:rPr lang="en-US" dirty="0"/>
-              <a:t>Health Management (food and medications), </a:t>
-            </a:r>
-          </a:p>
-          <a:p>
-            <a:pPr marL="171450" lvl="0" indent="-171450" algn="l" rtl="0">
-              <a:spcBef>
-                <a:spcPts val="0"/>
-              </a:spcBef>
-              <a:spcAft>
-                <a:spcPts val="0"/>
-              </a:spcAft>
-            </a:pPr>
-            <a:r>
-              <a:rPr lang="en-US" dirty="0"/>
-              <a:t>Personal Grooming (dressing/hygiene), </a:t>
-            </a:r>
-          </a:p>
-          <a:p>
-            <a:pPr marL="171450" lvl="0" indent="-171450" algn="l" rtl="0">
-              <a:spcBef>
-                <a:spcPts val="0"/>
-              </a:spcBef>
-              <a:spcAft>
-                <a:spcPts val="0"/>
-              </a:spcAft>
-            </a:pPr>
-            <a:r>
-              <a:rPr lang="en-US" dirty="0"/>
-              <a:t>Meal/Laundry Preparation, </a:t>
-            </a:r>
-          </a:p>
-          <a:p>
-            <a:pPr marL="171450" lvl="0" indent="-171450" algn="l" rtl="0">
-              <a:spcBef>
-                <a:spcPts val="0"/>
-              </a:spcBef>
-              <a:spcAft>
-                <a:spcPts val="0"/>
-              </a:spcAft>
-            </a:pPr>
-            <a:r>
-              <a:rPr lang="en-US" dirty="0"/>
-              <a:t>Financial Management (managing personal records, reading bills and statements, writing check/paying bills), </a:t>
-            </a:r>
-          </a:p>
-          <a:p>
-            <a:pPr marL="171450" lvl="0" indent="-171450" algn="l" rtl="0">
-              <a:spcBef>
-                <a:spcPts val="0"/>
-              </a:spcBef>
-              <a:spcAft>
-                <a:spcPts val="0"/>
-              </a:spcAft>
-            </a:pPr>
-            <a:r>
-              <a:rPr lang="en-US" dirty="0"/>
-              <a:t>Using the Telephone, </a:t>
-            </a:r>
-          </a:p>
-          <a:p>
-            <a:pPr marL="171450" lvl="0" indent="-171450" algn="l" rtl="0">
-              <a:spcBef>
-                <a:spcPts val="0"/>
-              </a:spcBef>
-              <a:spcAft>
-                <a:spcPts val="0"/>
-              </a:spcAft>
-            </a:pPr>
-            <a:r>
-              <a:rPr lang="en-US" dirty="0"/>
-              <a:t>Reading (e.g., books, labels, instructions, etc.), </a:t>
-            </a:r>
-          </a:p>
-          <a:p>
-            <a:pPr marL="171450" lvl="0" indent="-171450" algn="l" rtl="0">
-              <a:spcBef>
-                <a:spcPts val="0"/>
-              </a:spcBef>
-              <a:spcAft>
-                <a:spcPts val="0"/>
-              </a:spcAft>
-            </a:pPr>
-            <a:r>
-              <a:rPr lang="en-US" dirty="0"/>
-              <a:t>Writing (e.g., personal lists, notes, signature, etc.), </a:t>
-            </a:r>
-          </a:p>
-          <a:p>
-            <a:pPr marL="171450" lvl="0" indent="-171450" algn="l" rtl="0">
-              <a:spcBef>
-                <a:spcPts val="0"/>
-              </a:spcBef>
-              <a:spcAft>
-                <a:spcPts val="0"/>
-              </a:spcAft>
-            </a:pPr>
-            <a:r>
-              <a:rPr lang="en-US" dirty="0"/>
-              <a:t>Functional Mobility (e.g., up/downstairs, avoiding collisions/tripping, locate and read signs, adjusting to walking surface, etc.), </a:t>
-            </a:r>
-          </a:p>
-          <a:p>
-            <a:pPr marL="171450" lvl="0" indent="-171450" algn="l" rtl="0">
-              <a:spcBef>
-                <a:spcPts val="0"/>
-              </a:spcBef>
-              <a:spcAft>
-                <a:spcPts val="0"/>
-              </a:spcAft>
-            </a:pPr>
-            <a:r>
-              <a:rPr lang="en-US" dirty="0"/>
-              <a:t>Personal Activities (e.g., leisure activities, operating a radio/TV/phone/remotes, etc.)</a:t>
-            </a:r>
-            <a:endParaRPr dirty="0"/>
+            <a:pPr marL="0" lvl="0" indent="0" algn="l" rtl="0">
+              <a:spcBef>
+                <a:spcPts val="0"/>
+              </a:spcBef>
+              <a:spcAft>
+                <a:spcPts val="0"/>
+              </a:spcAft>
+              <a:buNone/>
+            </a:pPr>
+            <a:endParaRPr lang="en-US" dirty="0"/>
           </a:p>
         </p:txBody>
       </p:sp>
@@ -1241,7 +1126,331 @@
               </a:spcAft>
               <a:buNone/>
             </a:pPr>
-            <a:endParaRPr dirty="0"/>
+            <a:r>
+              <a:rPr lang="en-US" dirty="0"/>
+              <a:t>The R-SRAFVP was released in 2017 in two forms: Microsoft Word document and Excel spreadsheet</a:t>
+            </a:r>
+          </a:p>
+          <a:p>
+            <a:pPr marL="0" lvl="0" indent="0" algn="l" rtl="0">
+              <a:spcBef>
+                <a:spcPts val="0"/>
+              </a:spcBef>
+              <a:spcAft>
+                <a:spcPts val="0"/>
+              </a:spcAft>
+              <a:buNone/>
+            </a:pPr>
+            <a:endParaRPr lang="en-US" dirty="0"/>
+          </a:p>
+          <a:p>
+            <a:pPr marL="0" lvl="0" indent="0" algn="l" rtl="0">
+              <a:spcBef>
+                <a:spcPts val="0"/>
+              </a:spcBef>
+              <a:spcAft>
+                <a:spcPts val="0"/>
+              </a:spcAft>
+              <a:buNone/>
+            </a:pPr>
+            <a:r>
+              <a:rPr lang="en-US" dirty="0"/>
+              <a:t>This assessments reviews a patient’s functionality across 8 main categories. </a:t>
+            </a:r>
+          </a:p>
+          <a:p>
+            <a:pPr marL="0" lvl="0" indent="0" algn="l" rtl="0">
+              <a:spcBef>
+                <a:spcPts val="0"/>
+              </a:spcBef>
+              <a:spcAft>
+                <a:spcPts val="0"/>
+              </a:spcAft>
+              <a:buNone/>
+            </a:pPr>
+            <a:endParaRPr lang="en-US" dirty="0"/>
+          </a:p>
+          <a:p>
+            <a:pPr marL="0" lvl="0" indent="0" algn="l" rtl="0">
+              <a:spcBef>
+                <a:spcPts val="0"/>
+              </a:spcBef>
+              <a:spcAft>
+                <a:spcPts val="0"/>
+              </a:spcAft>
+              <a:buNone/>
+            </a:pPr>
+            <a:r>
+              <a:rPr lang="en-US" sz="1100" dirty="0">
+                <a:effectLst/>
+                <a:latin typeface="Arial" panose="020B0604020202020204" pitchFamily="34" charset="0"/>
+                <a:ea typeface="Arial" panose="020B0604020202020204" pitchFamily="34" charset="0"/>
+              </a:rPr>
+              <a:t>Each category contains several questions ranging from dealing with medications/food or personal grooming to reading, writing, and getting around without issue (e.g., tripping, going up or down stairs, etc.). </a:t>
+            </a:r>
+          </a:p>
+          <a:p>
+            <a:pPr marL="0" lvl="0" indent="0" algn="l" rtl="0">
+              <a:spcBef>
+                <a:spcPts val="0"/>
+              </a:spcBef>
+              <a:spcAft>
+                <a:spcPts val="0"/>
+              </a:spcAft>
+              <a:buNone/>
+            </a:pPr>
+            <a:endParaRPr lang="en-US" sz="1100" dirty="0">
+              <a:effectLst/>
+              <a:latin typeface="Arial" panose="020B0604020202020204" pitchFamily="34" charset="0"/>
+            </a:endParaRPr>
+          </a:p>
+          <a:p>
+            <a:pPr marL="0" lvl="0" indent="0" algn="l" rtl="0">
+              <a:spcBef>
+                <a:spcPts val="0"/>
+              </a:spcBef>
+              <a:spcAft>
+                <a:spcPts val="0"/>
+              </a:spcAft>
+              <a:buNone/>
+            </a:pPr>
+            <a:r>
+              <a:rPr lang="en-US" sz="1100" dirty="0">
+                <a:effectLst/>
+                <a:latin typeface="Arial" panose="020B0604020202020204" pitchFamily="34" charset="0"/>
+              </a:rPr>
+              <a:t>The question answers are based on the same rating scale.  Zero represents completely unable to accomplish the task.  Four means the patient is independent with the task.  There is a safeguard answer of NA for questions unanswered or not applicable.  The answers are tallied into an assessment score, level of impairment and Medicare code rating for treatment.</a:t>
+            </a:r>
+            <a:endParaRPr lang="en-US" dirty="0"/>
+          </a:p>
+          <a:p>
+            <a:pPr marL="0" lvl="0" indent="0" algn="l" rtl="0">
+              <a:spcBef>
+                <a:spcPts val="0"/>
+              </a:spcBef>
+              <a:spcAft>
+                <a:spcPts val="0"/>
+              </a:spcAft>
+              <a:buNone/>
+            </a:pPr>
+            <a:endParaRPr lang="en-US" dirty="0"/>
+          </a:p>
+          <a:p>
+            <a:pPr marL="0" lvl="0" indent="0" algn="l" rtl="0">
+              <a:spcBef>
+                <a:spcPts val="0"/>
+              </a:spcBef>
+              <a:spcAft>
+                <a:spcPts val="0"/>
+              </a:spcAft>
+              <a:buNone/>
+            </a:pPr>
+            <a:r>
+              <a:rPr lang="en-US" dirty="0"/>
+              <a:t>An attempt was made to make the Microsoft Excel spreadsheet version internet accessible.  This was a wrapper application site around the spreadsheet.</a:t>
+            </a:r>
+          </a:p>
+          <a:p>
+            <a:pPr marL="0" lvl="0" indent="0" algn="l" rtl="0">
+              <a:spcBef>
+                <a:spcPts val="0"/>
+              </a:spcBef>
+              <a:spcAft>
+                <a:spcPts val="0"/>
+              </a:spcAft>
+              <a:buNone/>
+            </a:pPr>
+            <a:endParaRPr lang="en-US" dirty="0"/>
+          </a:p>
+          <a:p>
+            <a:pPr marL="0" lvl="0" indent="0" algn="l" rtl="0">
+              <a:spcBef>
+                <a:spcPts val="0"/>
+              </a:spcBef>
+              <a:spcAft>
+                <a:spcPts val="0"/>
+              </a:spcAft>
+              <a:buNone/>
+            </a:pPr>
+            <a:r>
+              <a:rPr lang="en-US" sz="1800" dirty="0">
+                <a:effectLst/>
+                <a:latin typeface="Arial" panose="020B0604020202020204" pitchFamily="34" charset="0"/>
+                <a:ea typeface="Arial" panose="020B0604020202020204" pitchFamily="34" charset="0"/>
+              </a:rPr>
+              <a:t>Although each of these forms work on their own, the reasoning behind the new R-SRAFVP progressive web app is to </a:t>
+            </a:r>
+          </a:p>
+          <a:p>
+            <a:pPr marL="285750" lvl="0" indent="-285750" algn="l" rtl="0">
+              <a:spcBef>
+                <a:spcPts val="0"/>
+              </a:spcBef>
+              <a:spcAft>
+                <a:spcPts val="0"/>
+              </a:spcAft>
+            </a:pPr>
+            <a:r>
+              <a:rPr lang="en-US" sz="1800" dirty="0">
+                <a:effectLst/>
+                <a:latin typeface="Arial" panose="020B0604020202020204" pitchFamily="34" charset="0"/>
+                <a:ea typeface="Arial" panose="020B0604020202020204" pitchFamily="34" charset="0"/>
+              </a:rPr>
+              <a:t>Reduce human error, </a:t>
+            </a:r>
+          </a:p>
+          <a:p>
+            <a:pPr marL="285750" marR="0" lvl="0" indent="-285750" algn="l" defTabSz="914400" rtl="0" eaLnBrk="1" fontAlgn="auto" latinLnBrk="0" hangingPunct="1">
+              <a:lnSpc>
+                <a:spcPct val="100000"/>
+              </a:lnSpc>
+              <a:spcBef>
+                <a:spcPts val="0"/>
+              </a:spcBef>
+              <a:spcAft>
+                <a:spcPts val="0"/>
+              </a:spcAft>
+              <a:buClr>
+                <a:srgbClr val="000000"/>
+              </a:buClr>
+              <a:buSzPts val="1100"/>
+              <a:tabLst/>
+              <a:defRPr/>
+            </a:pPr>
+            <a:r>
+              <a:rPr lang="en-US" sz="1800" dirty="0">
+                <a:effectLst/>
+                <a:latin typeface="Arial" panose="020B0604020202020204" pitchFamily="34" charset="0"/>
+                <a:ea typeface="Arial" panose="020B0604020202020204" pitchFamily="34" charset="0"/>
+              </a:rPr>
+              <a:t>Simplicity of design, </a:t>
+            </a:r>
+          </a:p>
+          <a:p>
+            <a:pPr marL="285750" lvl="0" indent="-285750" algn="l" rtl="0">
+              <a:spcBef>
+                <a:spcPts val="0"/>
+              </a:spcBef>
+              <a:spcAft>
+                <a:spcPts val="0"/>
+              </a:spcAft>
+            </a:pPr>
+            <a:r>
+              <a:rPr lang="en-US" sz="1800" dirty="0">
+                <a:effectLst/>
+                <a:latin typeface="Arial" panose="020B0604020202020204" pitchFamily="34" charset="0"/>
+                <a:ea typeface="Arial" panose="020B0604020202020204" pitchFamily="34" charset="0"/>
+              </a:rPr>
+              <a:t>Improve ease of use, </a:t>
+            </a:r>
+          </a:p>
+          <a:p>
+            <a:pPr marL="285750" lvl="0" indent="-285750" algn="l" rtl="0">
+              <a:spcBef>
+                <a:spcPts val="0"/>
+              </a:spcBef>
+              <a:spcAft>
+                <a:spcPts val="0"/>
+              </a:spcAft>
+            </a:pPr>
+            <a:r>
+              <a:rPr lang="en-US" sz="1800" dirty="0">
+                <a:effectLst/>
+                <a:latin typeface="Arial" panose="020B0604020202020204" pitchFamily="34" charset="0"/>
+                <a:ea typeface="Arial" panose="020B0604020202020204" pitchFamily="34" charset="0"/>
+              </a:rPr>
+              <a:t>Greater accessibility, </a:t>
+            </a:r>
+          </a:p>
+          <a:p>
+            <a:pPr marL="285750" lvl="0" indent="-285750" algn="l" rtl="0">
+              <a:spcBef>
+                <a:spcPts val="0"/>
+              </a:spcBef>
+              <a:spcAft>
+                <a:spcPts val="0"/>
+              </a:spcAft>
+            </a:pPr>
+            <a:r>
+              <a:rPr lang="en-US" sz="1800" dirty="0">
+                <a:effectLst/>
+                <a:latin typeface="Arial" panose="020B0604020202020204" pitchFamily="34" charset="0"/>
+                <a:ea typeface="Arial" panose="020B0604020202020204" pitchFamily="34" charset="0"/>
+              </a:rPr>
+              <a:t>Improve use/adoption,</a:t>
+            </a:r>
+          </a:p>
+          <a:p>
+            <a:pPr marL="285750" lvl="0" indent="-285750" algn="l" rtl="0">
+              <a:spcBef>
+                <a:spcPts val="0"/>
+              </a:spcBef>
+              <a:spcAft>
+                <a:spcPts val="0"/>
+              </a:spcAft>
+            </a:pPr>
+            <a:r>
+              <a:rPr lang="en-US" sz="1800" dirty="0">
+                <a:effectLst/>
+                <a:latin typeface="Arial" panose="020B0604020202020204" pitchFamily="34" charset="0"/>
+                <a:ea typeface="Arial" panose="020B0604020202020204" pitchFamily="34" charset="0"/>
+              </a:rPr>
+              <a:t>Gather data to improve the assessment itself</a:t>
+            </a:r>
+          </a:p>
+          <a:p>
+            <a:pPr marL="285750" lvl="0" indent="-285750" algn="l" rtl="0">
+              <a:spcBef>
+                <a:spcPts val="0"/>
+              </a:spcBef>
+              <a:spcAft>
+                <a:spcPts val="0"/>
+              </a:spcAft>
+              <a:buFontTx/>
+              <a:buChar char="-"/>
+            </a:pPr>
+            <a:endParaRPr lang="en-US" sz="1800" dirty="0">
+              <a:effectLst/>
+              <a:latin typeface="Arial" panose="020B0604020202020204" pitchFamily="34" charset="0"/>
+              <a:ea typeface="Arial" panose="020B0604020202020204" pitchFamily="34" charset="0"/>
+            </a:endParaRPr>
+          </a:p>
+          <a:p>
+            <a:pPr marL="0" lvl="0" indent="0" algn="l" rtl="0">
+              <a:spcBef>
+                <a:spcPts val="0"/>
+              </a:spcBef>
+              <a:spcAft>
+                <a:spcPts val="0"/>
+              </a:spcAft>
+              <a:buFontTx/>
+              <a:buNone/>
+            </a:pPr>
+            <a:r>
+              <a:rPr lang="en-US" sz="1800" dirty="0">
+                <a:effectLst/>
+                <a:latin typeface="Arial" panose="020B0604020202020204" pitchFamily="34" charset="0"/>
+                <a:ea typeface="Arial" panose="020B0604020202020204" pitchFamily="34" charset="0"/>
+              </a:rPr>
+              <a:t>Used Software Engineering principles for project management, process, artifacts (use cases, requirements, UI/UX design, models), and reviews</a:t>
+            </a:r>
+          </a:p>
+          <a:p>
+            <a:pPr marL="285750" lvl="0" indent="-285750" algn="l" rtl="0">
+              <a:spcBef>
+                <a:spcPts val="0"/>
+              </a:spcBef>
+              <a:spcAft>
+                <a:spcPts val="0"/>
+              </a:spcAft>
+              <a:buFontTx/>
+              <a:buChar char="-"/>
+            </a:pPr>
+            <a:endParaRPr lang="en-US" sz="1800" dirty="0">
+              <a:effectLst/>
+              <a:latin typeface="Arial" panose="020B0604020202020204" pitchFamily="34" charset="0"/>
+              <a:ea typeface="Arial" panose="020B0604020202020204" pitchFamily="34" charset="0"/>
+            </a:endParaRPr>
           </a:p>
         </p:txBody>
       </p:sp>
@@ -1410,7 +1619,518 @@
               </a:spcAft>
               <a:buNone/>
             </a:pPr>
-            <a:endParaRPr/>
+            <a:r>
+              <a:rPr lang="en-US" dirty="0"/>
+              <a:t>This project built a new R-SRAFVP application using Cloud Computing capabilities</a:t>
+            </a:r>
+          </a:p>
+          <a:p>
+            <a:pPr marL="171450" lvl="0" indent="-171450" algn="l" rtl="0">
+              <a:spcBef>
+                <a:spcPts val="0"/>
+              </a:spcBef>
+              <a:spcAft>
+                <a:spcPts val="0"/>
+              </a:spcAft>
+            </a:pPr>
+            <a:r>
+              <a:rPr lang="en-US" dirty="0"/>
+              <a:t>A progressive web application</a:t>
+            </a:r>
+          </a:p>
+          <a:p>
+            <a:pPr marL="171450" lvl="0" indent="-171450" algn="l" rtl="0">
+              <a:spcBef>
+                <a:spcPts val="0"/>
+              </a:spcBef>
+              <a:spcAft>
+                <a:spcPts val="0"/>
+              </a:spcAft>
+            </a:pPr>
+            <a:r>
+              <a:rPr lang="en-US" dirty="0"/>
+              <a:t>Discoverable on the web </a:t>
+            </a:r>
+          </a:p>
+          <a:p>
+            <a:pPr marL="171450" lvl="0" indent="-171450" algn="l" rtl="0">
+              <a:spcBef>
+                <a:spcPts val="0"/>
+              </a:spcBef>
+              <a:spcAft>
+                <a:spcPts val="0"/>
+              </a:spcAft>
+            </a:pPr>
+            <a:r>
+              <a:rPr lang="en-US" dirty="0"/>
+              <a:t>Shareable</a:t>
+            </a:r>
+          </a:p>
+          <a:p>
+            <a:pPr marL="171450" marR="0" lvl="0" indent="-171450" algn="l" defTabSz="914400" rtl="0" eaLnBrk="1" fontAlgn="auto" latinLnBrk="0" hangingPunct="1">
+              <a:lnSpc>
+                <a:spcPct val="100000"/>
+              </a:lnSpc>
+              <a:spcBef>
+                <a:spcPts val="0"/>
+              </a:spcBef>
+              <a:spcAft>
+                <a:spcPts val="0"/>
+              </a:spcAft>
+              <a:buClr>
+                <a:srgbClr val="000000"/>
+              </a:buClr>
+              <a:buSzPts val="1100"/>
+              <a:tabLst/>
+              <a:defRPr/>
+            </a:pPr>
+            <a:r>
+              <a:rPr lang="en-US" dirty="0"/>
+              <a:t>Responsive design</a:t>
+            </a:r>
+          </a:p>
+          <a:p>
+            <a:pPr marL="171450" lvl="0" indent="-171450" algn="l" rtl="0">
+              <a:spcBef>
+                <a:spcPts val="0"/>
+              </a:spcBef>
+              <a:spcAft>
+                <a:spcPts val="0"/>
+              </a:spcAft>
+            </a:pPr>
+            <a:r>
+              <a:rPr lang="en-US" dirty="0"/>
+              <a:t>Security throughout</a:t>
+            </a:r>
+          </a:p>
+          <a:p>
+            <a:pPr marL="171450" lvl="0" indent="-171450" algn="l" rtl="0">
+              <a:spcBef>
+                <a:spcPts val="0"/>
+              </a:spcBef>
+              <a:spcAft>
+                <a:spcPts val="0"/>
+              </a:spcAft>
+            </a:pPr>
+            <a:r>
+              <a:rPr lang="en-US" dirty="0"/>
+              <a:t>Progressive enhancement</a:t>
+            </a:r>
+          </a:p>
+          <a:p>
+            <a:pPr marL="171450" lvl="0" indent="-171450" algn="l" rtl="0">
+              <a:spcBef>
+                <a:spcPts val="0"/>
+              </a:spcBef>
+              <a:spcAft>
+                <a:spcPts val="0"/>
+              </a:spcAft>
+            </a:pPr>
+            <a:r>
+              <a:rPr lang="en-US" dirty="0"/>
+              <a:t>Single code base across multiple device types and platforms </a:t>
+            </a:r>
+          </a:p>
+          <a:p>
+            <a:pPr marL="171450" lvl="0" indent="-171450" algn="l" rtl="0">
+              <a:spcBef>
+                <a:spcPts val="0"/>
+              </a:spcBef>
+              <a:spcAft>
+                <a:spcPts val="0"/>
+              </a:spcAft>
+            </a:pPr>
+            <a:r>
+              <a:rPr lang="en-US" dirty="0"/>
+              <a:t>Uses cloud computing services</a:t>
+            </a:r>
+          </a:p>
+          <a:p>
+            <a:pPr marL="171450" lvl="0" indent="-171450" algn="l" rtl="0">
+              <a:spcBef>
+                <a:spcPts val="0"/>
+              </a:spcBef>
+              <a:spcAft>
+                <a:spcPts val="0"/>
+              </a:spcAft>
+              <a:buFontTx/>
+              <a:buChar char="-"/>
+            </a:pPr>
+            <a:endParaRPr lang="en-US" dirty="0"/>
+          </a:p>
+          <a:p>
+            <a:pPr marL="0" lvl="0" indent="0" algn="l" rtl="0">
+              <a:spcBef>
+                <a:spcPts val="0"/>
+              </a:spcBef>
+              <a:spcAft>
+                <a:spcPts val="0"/>
+              </a:spcAft>
+              <a:buFontTx/>
+              <a:buNone/>
+            </a:pPr>
+            <a:r>
+              <a:rPr lang="en-US" dirty="0"/>
+              <a:t>The main architecture for the progressive web application is</a:t>
+            </a:r>
+          </a:p>
+          <a:p>
+            <a:pPr marL="171450" lvl="0" indent="-171450" algn="l" rtl="0">
+              <a:spcBef>
+                <a:spcPts val="0"/>
+              </a:spcBef>
+              <a:spcAft>
+                <a:spcPts val="0"/>
+              </a:spcAft>
+            </a:pPr>
+            <a:r>
+              <a:rPr lang="en-US" dirty="0"/>
+              <a:t>Hosting through Google sites</a:t>
+            </a:r>
+          </a:p>
+          <a:p>
+            <a:pPr marL="171450" lvl="0" indent="-171450" algn="l" rtl="0">
+              <a:spcBef>
+                <a:spcPts val="0"/>
+              </a:spcBef>
+              <a:spcAft>
+                <a:spcPts val="0"/>
+              </a:spcAft>
+            </a:pPr>
+            <a:r>
+              <a:rPr lang="en-US" dirty="0"/>
+              <a:t>Firebase is used for the project and cloud services</a:t>
+            </a:r>
+          </a:p>
+          <a:p>
+            <a:pPr marL="171450" marR="0" lvl="0" indent="-171450" algn="l" defTabSz="914400" rtl="0" eaLnBrk="1" fontAlgn="auto" latinLnBrk="0" hangingPunct="1">
+              <a:lnSpc>
+                <a:spcPct val="100000"/>
+              </a:lnSpc>
+              <a:spcBef>
+                <a:spcPts val="0"/>
+              </a:spcBef>
+              <a:spcAft>
+                <a:spcPts val="0"/>
+              </a:spcAft>
+              <a:buClr>
+                <a:srgbClr val="000000"/>
+              </a:buClr>
+              <a:buSzPts val="1100"/>
+              <a:tabLst/>
+              <a:defRPr/>
+            </a:pPr>
+            <a:r>
+              <a:rPr lang="en-US" dirty="0"/>
+              <a:t>Cloud services implemented are authentication, analytics and </a:t>
+            </a:r>
+            <a:r>
+              <a:rPr lang="en-US" dirty="0" err="1"/>
+              <a:t>Firestore</a:t>
+            </a:r>
+            <a:r>
+              <a:rPr lang="en-US" dirty="0"/>
+              <a:t> (no SQL database)</a:t>
+            </a:r>
+          </a:p>
+          <a:p>
+            <a:pPr marL="171450" lvl="0" indent="-171450" algn="l" rtl="0">
+              <a:spcBef>
+                <a:spcPts val="0"/>
+              </a:spcBef>
+              <a:spcAft>
+                <a:spcPts val="0"/>
+              </a:spcAft>
+            </a:pPr>
+            <a:r>
+              <a:rPr lang="en-US" dirty="0"/>
+              <a:t>Core languages used are HTML, CSS and JavaScript</a:t>
+            </a:r>
+          </a:p>
+          <a:p>
+            <a:pPr marL="0" lvl="0" indent="0" algn="l" rtl="0">
+              <a:spcBef>
+                <a:spcPts val="0"/>
+              </a:spcBef>
+              <a:spcAft>
+                <a:spcPts val="0"/>
+              </a:spcAft>
+              <a:buNone/>
+            </a:pPr>
+            <a:endParaRPr lang="en-US" dirty="0"/>
+          </a:p>
+          <a:p>
+            <a:pPr marL="0" marR="0" lvl="0" indent="0" algn="l" defTabSz="914400" rtl="0" eaLnBrk="1" fontAlgn="auto" latinLnBrk="0" hangingPunct="1">
+              <a:lnSpc>
+                <a:spcPct val="100000"/>
+              </a:lnSpc>
+              <a:spcBef>
+                <a:spcPts val="0"/>
+              </a:spcBef>
+              <a:spcAft>
+                <a:spcPts val="0"/>
+              </a:spcAft>
+              <a:buClr>
+                <a:srgbClr val="000000"/>
+              </a:buClr>
+              <a:buSzPts val="1100"/>
+              <a:buFont typeface="Arial"/>
+              <a:buNone/>
+              <a:tabLst/>
+              <a:defRPr/>
+            </a:pPr>
+            <a:r>
+              <a:rPr lang="en-US" dirty="0"/>
+              <a:t>The progressive web application makes the assessment available to any medical professionals specializing in low vision rehabilitation</a:t>
+            </a:r>
+          </a:p>
+          <a:p>
+            <a:pPr marL="0" lvl="0" indent="0" algn="l" rtl="0">
+              <a:spcBef>
+                <a:spcPts val="0"/>
+              </a:spcBef>
+              <a:spcAft>
+                <a:spcPts val="0"/>
+              </a:spcAft>
+              <a:buNone/>
+            </a:pPr>
+            <a:r>
+              <a:rPr lang="en-US" dirty="0"/>
+              <a:t>- Although Occupational Therapists specializing in low vision are the target audience.</a:t>
+            </a:r>
+          </a:p>
+          <a:p>
+            <a:pPr marL="0" lvl="0" indent="0" algn="l" rtl="0">
+              <a:spcBef>
+                <a:spcPts val="0"/>
+              </a:spcBef>
+              <a:spcAft>
+                <a:spcPts val="0"/>
+              </a:spcAft>
+              <a:buNone/>
+            </a:pPr>
+            <a:endParaRPr lang="en-US" dirty="0"/>
+          </a:p>
+          <a:p>
+            <a:pPr marL="0" marR="0" lvl="0" indent="0" algn="l" defTabSz="914400" rtl="0" eaLnBrk="1" fontAlgn="auto" latinLnBrk="0" hangingPunct="1">
+              <a:lnSpc>
+                <a:spcPct val="100000"/>
+              </a:lnSpc>
+              <a:spcBef>
+                <a:spcPts val="0"/>
+              </a:spcBef>
+              <a:spcAft>
+                <a:spcPts val="0"/>
+              </a:spcAft>
+              <a:buClr>
+                <a:srgbClr val="000000"/>
+              </a:buClr>
+              <a:buSzPts val="1100"/>
+              <a:buFont typeface="Arial"/>
+              <a:buNone/>
+              <a:tabLst/>
+              <a:defRPr/>
+            </a:pPr>
+            <a:r>
+              <a:rPr lang="en-US" dirty="0"/>
+              <a:t>There are a total of 11 webpages, but the core functionality is the active assessment screen</a:t>
+            </a:r>
+          </a:p>
+          <a:p>
+            <a:pPr marL="171450" lvl="0" indent="-171450" algn="l" rtl="0">
+              <a:spcBef>
+                <a:spcPts val="0"/>
+              </a:spcBef>
+              <a:spcAft>
+                <a:spcPts val="0"/>
+              </a:spcAft>
+            </a:pPr>
+            <a:r>
+              <a:rPr lang="en-US" dirty="0"/>
+              <a:t>There are 3 tabs for the assessment and 2 tabs for help</a:t>
+            </a:r>
+          </a:p>
+          <a:p>
+            <a:pPr marL="171450" lvl="0" indent="-171450" algn="l" rtl="0">
+              <a:spcBef>
+                <a:spcPts val="0"/>
+              </a:spcBef>
+              <a:spcAft>
+                <a:spcPts val="0"/>
+              </a:spcAft>
+            </a:pPr>
+            <a:r>
+              <a:rPr lang="en-US" dirty="0"/>
+              <a:t>The assessment tabs contain general information; questions, answers and comments; and scoring</a:t>
+            </a:r>
+          </a:p>
+          <a:p>
+            <a:pPr marL="171450" lvl="0" indent="-171450" algn="l" rtl="0">
+              <a:spcBef>
+                <a:spcPts val="0"/>
+              </a:spcBef>
+              <a:spcAft>
+                <a:spcPts val="0"/>
+              </a:spcAft>
+            </a:pPr>
+            <a:r>
+              <a:rPr lang="en-US" dirty="0"/>
+              <a:t>The help tabs contain the scoring scale (for answering help) and Medicare Code (for therapist reference)</a:t>
+            </a:r>
+          </a:p>
+          <a:p>
+            <a:pPr marL="0" lvl="0" indent="0" algn="l" rtl="0">
+              <a:spcBef>
+                <a:spcPts val="0"/>
+              </a:spcBef>
+              <a:spcAft>
+                <a:spcPts val="0"/>
+              </a:spcAft>
+              <a:buNone/>
+            </a:pPr>
+            <a:endParaRPr lang="en-US" dirty="0"/>
+          </a:p>
+          <a:p>
+            <a:pPr marL="0" lvl="0" indent="0" algn="l" rtl="0">
+              <a:spcBef>
+                <a:spcPts val="0"/>
+              </a:spcBef>
+              <a:spcAft>
+                <a:spcPts val="0"/>
+              </a:spcAft>
+              <a:buNone/>
+            </a:pPr>
+            <a:r>
+              <a:rPr lang="en-US" dirty="0"/>
+              <a:t>Once the user moves to the scoring tab, the assessment is fully scored</a:t>
+            </a:r>
+          </a:p>
+          <a:p>
+            <a:pPr marL="0" lvl="0" indent="0" algn="l" rtl="0">
+              <a:spcBef>
+                <a:spcPts val="0"/>
+              </a:spcBef>
+              <a:spcAft>
+                <a:spcPts val="0"/>
+              </a:spcAft>
+              <a:buNone/>
+            </a:pPr>
+            <a:r>
+              <a:rPr lang="en-US" dirty="0"/>
+              <a:t>The user can print, export or reset the assessment for the next patient</a:t>
+            </a:r>
+          </a:p>
+          <a:p>
+            <a:pPr marL="0" lvl="0" indent="0" algn="l" rtl="0">
+              <a:spcBef>
+                <a:spcPts val="0"/>
+              </a:spcBef>
+              <a:spcAft>
+                <a:spcPts val="0"/>
+              </a:spcAft>
+              <a:buNone/>
+            </a:pPr>
+            <a:endParaRPr lang="en-US" dirty="0"/>
+          </a:p>
+          <a:p>
+            <a:pPr marL="0" marR="0" lvl="0" indent="0" algn="l" defTabSz="914400" rtl="0" eaLnBrk="1" fontAlgn="auto" latinLnBrk="0" hangingPunct="1">
+              <a:lnSpc>
+                <a:spcPct val="100000"/>
+              </a:lnSpc>
+              <a:spcBef>
+                <a:spcPts val="0"/>
+              </a:spcBef>
+              <a:spcAft>
+                <a:spcPts val="0"/>
+              </a:spcAft>
+              <a:buClr>
+                <a:srgbClr val="000000"/>
+              </a:buClr>
+              <a:buSzPts val="1100"/>
+              <a:buFont typeface="Arial"/>
+              <a:buNone/>
+              <a:tabLst/>
+              <a:defRPr/>
+            </a:pPr>
+            <a:r>
+              <a:rPr lang="en-US" dirty="0"/>
+              <a:t>Authentication can be done through site registration or using a Google account</a:t>
+            </a:r>
+          </a:p>
+          <a:p>
+            <a:pPr marL="0" lvl="0" indent="0" algn="l" rtl="0">
+              <a:spcBef>
+                <a:spcPts val="0"/>
+              </a:spcBef>
+              <a:spcAft>
+                <a:spcPts val="0"/>
+              </a:spcAft>
+              <a:buNone/>
+            </a:pPr>
+            <a:r>
+              <a:rPr lang="en-US" dirty="0"/>
+              <a:t>If the user is authenticated, additional functionality becomes available to save, recall, or delete assessments</a:t>
+            </a:r>
+          </a:p>
+          <a:p>
+            <a:pPr marL="0" lvl="0" indent="0" algn="l" rtl="0">
+              <a:spcBef>
+                <a:spcPts val="0"/>
+              </a:spcBef>
+              <a:spcAft>
+                <a:spcPts val="0"/>
+              </a:spcAft>
+              <a:buNone/>
+            </a:pPr>
+            <a:endParaRPr lang="en-US" dirty="0"/>
+          </a:p>
+          <a:p>
+            <a:pPr marL="0" lvl="0" indent="0" algn="l" rtl="0">
+              <a:spcBef>
+                <a:spcPts val="0"/>
+              </a:spcBef>
+              <a:spcAft>
+                <a:spcPts val="0"/>
+              </a:spcAft>
+              <a:buNone/>
+            </a:pPr>
+            <a:endParaRPr lang="en-US" dirty="0"/>
+          </a:p>
+          <a:p>
+            <a:pPr marL="0" lvl="0" indent="0" algn="l" rtl="0">
+              <a:spcBef>
+                <a:spcPts val="0"/>
+              </a:spcBef>
+              <a:spcAft>
+                <a:spcPts val="0"/>
+              </a:spcAft>
+              <a:buNone/>
+            </a:pPr>
+            <a:endParaRPr lang="en-US" dirty="0"/>
+          </a:p>
+          <a:p>
+            <a:pPr marL="0" lvl="0" indent="0" algn="l" rtl="0">
+              <a:spcBef>
+                <a:spcPts val="0"/>
+              </a:spcBef>
+              <a:spcAft>
+                <a:spcPts val="0"/>
+              </a:spcAft>
+              <a:buNone/>
+            </a:pPr>
+            <a:endParaRPr lang="en-US" dirty="0"/>
+          </a:p>
+          <a:p>
+            <a:pPr marL="0" lvl="0" indent="0" algn="l" rtl="0">
+              <a:spcBef>
+                <a:spcPts val="0"/>
+              </a:spcBef>
+              <a:spcAft>
+                <a:spcPts val="0"/>
+              </a:spcAft>
+              <a:buNone/>
+            </a:pPr>
+            <a:endParaRPr lang="en-US" dirty="0"/>
           </a:p>
         </p:txBody>
       </p:sp>
@@ -1579,7 +2299,137 @@
               </a:spcAft>
               <a:buNone/>
             </a:pPr>
-            <a:endParaRPr/>
+            <a:r>
+              <a:rPr lang="en-US" dirty="0"/>
+              <a:t>Shown here are metrics from the live site: www.rsrafvp.com</a:t>
+            </a:r>
+          </a:p>
+          <a:p>
+            <a:pPr marL="0" lvl="0" indent="0" algn="l" rtl="0">
+              <a:spcBef>
+                <a:spcPts val="0"/>
+              </a:spcBef>
+              <a:spcAft>
+                <a:spcPts val="0"/>
+              </a:spcAft>
+              <a:buNone/>
+            </a:pPr>
+            <a:endParaRPr lang="en-US" dirty="0"/>
+          </a:p>
+          <a:p>
+            <a:pPr marL="0" lvl="0" indent="0" algn="l" rtl="0">
+              <a:spcBef>
+                <a:spcPts val="0"/>
+              </a:spcBef>
+              <a:spcAft>
+                <a:spcPts val="0"/>
+              </a:spcAft>
+              <a:buNone/>
+            </a:pPr>
+            <a:r>
+              <a:rPr lang="en-US" dirty="0"/>
+              <a:t>The site went live on Nov 1 with Release 1</a:t>
+            </a:r>
+          </a:p>
+          <a:p>
+            <a:pPr marL="0" lvl="0" indent="0" algn="l" rtl="0">
+              <a:spcBef>
+                <a:spcPts val="0"/>
+              </a:spcBef>
+              <a:spcAft>
+                <a:spcPts val="0"/>
+              </a:spcAft>
+              <a:buNone/>
+            </a:pPr>
+            <a:r>
+              <a:rPr lang="en-US" dirty="0"/>
+              <a:t>The site was update on Nov 20 with Release 2 functionality</a:t>
+            </a:r>
+          </a:p>
+          <a:p>
+            <a:pPr marL="0" lvl="0" indent="0" algn="l" rtl="0">
+              <a:spcBef>
+                <a:spcPts val="0"/>
+              </a:spcBef>
+              <a:spcAft>
+                <a:spcPts val="0"/>
+              </a:spcAft>
+              <a:buNone/>
+            </a:pPr>
+            <a:endParaRPr lang="en-US" dirty="0"/>
+          </a:p>
+          <a:p>
+            <a:pPr marL="0" lvl="0" indent="0" algn="l" rtl="0">
+              <a:spcBef>
+                <a:spcPts val="0"/>
+              </a:spcBef>
+              <a:spcAft>
+                <a:spcPts val="0"/>
+              </a:spcAft>
+              <a:buNone/>
+            </a:pPr>
+            <a:r>
+              <a:rPr lang="en-US" dirty="0"/>
+              <a:t>Metrics are being tracked for pages used, locations visitors are from, devices using the site</a:t>
+            </a:r>
+          </a:p>
+          <a:p>
+            <a:pPr marL="0" lvl="0" indent="0" algn="l" rtl="0">
+              <a:spcBef>
+                <a:spcPts val="0"/>
+              </a:spcBef>
+              <a:spcAft>
+                <a:spcPts val="0"/>
+              </a:spcAft>
+              <a:buNone/>
+            </a:pPr>
+            <a:endParaRPr lang="en-US" dirty="0"/>
+          </a:p>
+          <a:p>
+            <a:pPr marL="0" lvl="0" indent="0" algn="l" rtl="0">
+              <a:spcBef>
+                <a:spcPts val="0"/>
+              </a:spcBef>
+              <a:spcAft>
+                <a:spcPts val="0"/>
+              </a:spcAft>
+              <a:buNone/>
+            </a:pPr>
+            <a:r>
+              <a:rPr lang="en-US" dirty="0"/>
+              <a:t>Real users, real </a:t>
+            </a:r>
+            <a:r>
+              <a:rPr lang="en-US"/>
+              <a:t>patient outcomes</a:t>
+            </a:r>
+          </a:p>
+          <a:p>
+            <a:pPr marL="0" lvl="0" indent="0" algn="l" rtl="0">
+              <a:spcBef>
+                <a:spcPts val="0"/>
+              </a:spcBef>
+              <a:spcAft>
+                <a:spcPts val="0"/>
+              </a:spcAft>
+              <a:buNone/>
+            </a:pPr>
+            <a:endParaRPr lang="en-US" dirty="0"/>
+          </a:p>
+          <a:p>
+            <a:pPr marL="0" lvl="0" indent="0" algn="l" rtl="0">
+              <a:spcBef>
+                <a:spcPts val="0"/>
+              </a:spcBef>
+              <a:spcAft>
+                <a:spcPts val="0"/>
+              </a:spcAft>
+              <a:buNone/>
+            </a:pPr>
+            <a:r>
+              <a:rPr lang="en-US" dirty="0"/>
+              <a:t>Making a simple assessment much easier through software engineering and cloud computing services.</a:t>
+            </a:r>
           </a:p>
         </p:txBody>
       </p:sp>

</xml_diff>